<commit_message>
TW edit to standalone diagram
</commit_message>
<xml_diff>
--- a/docs/deployment_guide/images/inductive-automation-ignition-architecture-diagrams.pptx
+++ b/docs/deployment_guide/images/inductive-automation-ignition-architecture-diagrams.pptx
@@ -284,7 +284,7 @@
           <a:p>
             <a:fld id="{F703F098-99EB-4D67-BF03-ED00B29450C6}" type="datetimeFigureOut">
               <a:rPr lang="en-US" smtClean="0"/>
-              <a:t>2/8/2023</a:t>
+              <a:t>2/10/2023</a:t>
             </a:fld>
             <a:endParaRPr lang="en-US"/>
           </a:p>
@@ -454,7 +454,7 @@
           <a:p>
             <a:fld id="{F703F098-99EB-4D67-BF03-ED00B29450C6}" type="datetimeFigureOut">
               <a:rPr lang="en-US" smtClean="0"/>
-              <a:t>2/8/2023</a:t>
+              <a:t>2/10/2023</a:t>
             </a:fld>
             <a:endParaRPr lang="en-US"/>
           </a:p>
@@ -634,7 +634,7 @@
           <a:p>
             <a:fld id="{F703F098-99EB-4D67-BF03-ED00B29450C6}" type="datetimeFigureOut">
               <a:rPr lang="en-US" smtClean="0"/>
-              <a:t>2/8/2023</a:t>
+              <a:t>2/10/2023</a:t>
             </a:fld>
             <a:endParaRPr lang="en-US"/>
           </a:p>
@@ -804,7 +804,7 @@
           <a:p>
             <a:fld id="{F703F098-99EB-4D67-BF03-ED00B29450C6}" type="datetimeFigureOut">
               <a:rPr lang="en-US" smtClean="0"/>
-              <a:t>2/8/2023</a:t>
+              <a:t>2/10/2023</a:t>
             </a:fld>
             <a:endParaRPr lang="en-US"/>
           </a:p>
@@ -1048,7 +1048,7 @@
           <a:p>
             <a:fld id="{F703F098-99EB-4D67-BF03-ED00B29450C6}" type="datetimeFigureOut">
               <a:rPr lang="en-US" smtClean="0"/>
-              <a:t>2/8/2023</a:t>
+              <a:t>2/10/2023</a:t>
             </a:fld>
             <a:endParaRPr lang="en-US"/>
           </a:p>
@@ -1280,7 +1280,7 @@
           <a:p>
             <a:fld id="{F703F098-99EB-4D67-BF03-ED00B29450C6}" type="datetimeFigureOut">
               <a:rPr lang="en-US" smtClean="0"/>
-              <a:t>2/8/2023</a:t>
+              <a:t>2/10/2023</a:t>
             </a:fld>
             <a:endParaRPr lang="en-US"/>
           </a:p>
@@ -1647,7 +1647,7 @@
           <a:p>
             <a:fld id="{F703F098-99EB-4D67-BF03-ED00B29450C6}" type="datetimeFigureOut">
               <a:rPr lang="en-US" smtClean="0"/>
-              <a:t>2/8/2023</a:t>
+              <a:t>2/10/2023</a:t>
             </a:fld>
             <a:endParaRPr lang="en-US"/>
           </a:p>
@@ -1765,7 +1765,7 @@
           <a:p>
             <a:fld id="{F703F098-99EB-4D67-BF03-ED00B29450C6}" type="datetimeFigureOut">
               <a:rPr lang="en-US" smtClean="0"/>
-              <a:t>2/8/2023</a:t>
+              <a:t>2/10/2023</a:t>
             </a:fld>
             <a:endParaRPr lang="en-US"/>
           </a:p>
@@ -1860,7 +1860,7 @@
           <a:p>
             <a:fld id="{F703F098-99EB-4D67-BF03-ED00B29450C6}" type="datetimeFigureOut">
               <a:rPr lang="en-US" smtClean="0"/>
-              <a:t>2/8/2023</a:t>
+              <a:t>2/10/2023</a:t>
             </a:fld>
             <a:endParaRPr lang="en-US"/>
           </a:p>
@@ -2137,7 +2137,7 @@
           <a:p>
             <a:fld id="{F703F098-99EB-4D67-BF03-ED00B29450C6}" type="datetimeFigureOut">
               <a:rPr lang="en-US" smtClean="0"/>
-              <a:t>2/8/2023</a:t>
+              <a:t>2/10/2023</a:t>
             </a:fld>
             <a:endParaRPr lang="en-US"/>
           </a:p>
@@ -2394,7 +2394,7 @@
           <a:p>
             <a:fld id="{F703F098-99EB-4D67-BF03-ED00B29450C6}" type="datetimeFigureOut">
               <a:rPr lang="en-US" smtClean="0"/>
-              <a:t>2/8/2023</a:t>
+              <a:t>2/10/2023</a:t>
             </a:fld>
             <a:endParaRPr lang="en-US"/>
           </a:p>
@@ -2607,7 +2607,7 @@
           <a:p>
             <a:fld id="{F703F098-99EB-4D67-BF03-ED00B29450C6}" type="datetimeFigureOut">
               <a:rPr lang="en-US" smtClean="0"/>
-              <a:t>2/8/2023</a:t>
+              <a:t>2/10/2023</a:t>
             </a:fld>
             <a:endParaRPr lang="en-US"/>
           </a:p>
@@ -7485,10 +7485,196 @@
       </p:sp>
       <p:pic>
         <p:nvPicPr>
-          <p:cNvPr id="95" name="Graphic 60">
+          <p:cNvPr id="96" name="Graphic 95">
             <a:extLst>
               <a:ext uri="{FF2B5EF4-FFF2-40B4-BE49-F238E27FC236}">
-                <a16:creationId xmlns:a16="http://schemas.microsoft.com/office/drawing/2014/main" id="{4E4B0064-4C64-41FD-A3CF-EE17EF2A2247}"/>
+                <a16:creationId xmlns:a16="http://schemas.microsoft.com/office/drawing/2014/main" id="{05BEC7FA-85AB-4B62-A8C8-793BCCFBC367}"/>
+              </a:ext>
+            </a:extLst>
+          </p:cNvPr>
+          <p:cNvPicPr>
+            <a:picLocks noChangeAspect="1"/>
+          </p:cNvPicPr>
+          <p:nvPr/>
+        </p:nvPicPr>
+        <p:blipFill>
+          <a:blip r:embed="rId16">
+            <a:extLst>
+              <a:ext uri="{96DAC541-7B7A-43D3-8B79-37D633B846F1}">
+                <asvg:svgBlip xmlns:asvg="http://schemas.microsoft.com/office/drawing/2016/SVG/main" r:embed="rId17"/>
+              </a:ext>
+            </a:extLst>
+          </a:blip>
+          <a:stretch>
+            <a:fillRect/>
+          </a:stretch>
+        </p:blipFill>
+        <p:spPr>
+          <a:xfrm>
+            <a:off x="9261385" y="2525662"/>
+            <a:ext cx="330200" cy="330200"/>
+          </a:xfrm>
+          <a:prstGeom prst="rect">
+            <a:avLst/>
+          </a:prstGeom>
+        </p:spPr>
+      </p:pic>
+      <p:pic>
+        <p:nvPicPr>
+          <p:cNvPr id="97" name="Graphic 96">
+            <a:extLst>
+              <a:ext uri="{FF2B5EF4-FFF2-40B4-BE49-F238E27FC236}">
+                <a16:creationId xmlns:a16="http://schemas.microsoft.com/office/drawing/2014/main" id="{A87BFE51-1EA6-4570-81C3-20628DBE749F}"/>
+              </a:ext>
+            </a:extLst>
+          </p:cNvPr>
+          <p:cNvPicPr>
+            <a:picLocks noChangeAspect="1"/>
+          </p:cNvPicPr>
+          <p:nvPr/>
+        </p:nvPicPr>
+        <p:blipFill>
+          <a:blip r:embed="rId18">
+            <a:extLst>
+              <a:ext uri="{96DAC541-7B7A-43D3-8B79-37D633B846F1}">
+                <asvg:svgBlip xmlns:asvg="http://schemas.microsoft.com/office/drawing/2016/SVG/main" r:embed="rId19"/>
+              </a:ext>
+            </a:extLst>
+          </a:blip>
+          <a:stretch>
+            <a:fillRect/>
+          </a:stretch>
+        </p:blipFill>
+        <p:spPr>
+          <a:xfrm>
+            <a:off x="7072472" y="3509893"/>
+            <a:ext cx="457200" cy="457200"/>
+          </a:xfrm>
+          <a:prstGeom prst="rect">
+            <a:avLst/>
+          </a:prstGeom>
+        </p:spPr>
+      </p:pic>
+      <p:sp>
+        <p:nvSpPr>
+          <p:cNvPr id="98" name="TextBox 97">
+            <a:extLst>
+              <a:ext uri="{FF2B5EF4-FFF2-40B4-BE49-F238E27FC236}">
+                <a16:creationId xmlns:a16="http://schemas.microsoft.com/office/drawing/2014/main" id="{2B774141-3304-4EF1-877E-9760009B4190}"/>
+              </a:ext>
+            </a:extLst>
+          </p:cNvPr>
+          <p:cNvSpPr txBox="1"/>
+          <p:nvPr/>
+        </p:nvSpPr>
+        <p:spPr>
+          <a:xfrm>
+            <a:off x="6684453" y="3941852"/>
+            <a:ext cx="1233238" cy="261610"/>
+          </a:xfrm>
+          <a:prstGeom prst="rect">
+            <a:avLst/>
+          </a:prstGeom>
+          <a:noFill/>
+        </p:spPr>
+        <p:txBody>
+          <a:bodyPr wrap="square" rtlCol="0">
+            <a:spAutoFit/>
+          </a:bodyPr>
+          <a:lstStyle/>
+          <a:p>
+            <a:pPr algn="ctr"/>
+            <a:r>
+              <a:rPr lang="en-US" sz="1100" dirty="0">
+                <a:latin typeface="Arial" panose="020B0604020202020204" pitchFamily="34" charset="0"/>
+                <a:cs typeface="Arial" panose="020B0604020202020204" pitchFamily="34" charset="0"/>
+              </a:rPr>
+              <a:t>Ignition (primary)</a:t>
+            </a:r>
+          </a:p>
+        </p:txBody>
+      </p:sp>
+      <p:pic>
+        <p:nvPicPr>
+          <p:cNvPr id="99" name="Graphic 98">
+            <a:extLst>
+              <a:ext uri="{FF2B5EF4-FFF2-40B4-BE49-F238E27FC236}">
+                <a16:creationId xmlns:a16="http://schemas.microsoft.com/office/drawing/2014/main" id="{C3625EC4-0DF0-4D2E-BF9E-E8A11359F645}"/>
+              </a:ext>
+            </a:extLst>
+          </p:cNvPr>
+          <p:cNvPicPr>
+            <a:picLocks noChangeAspect="1"/>
+          </p:cNvPicPr>
+          <p:nvPr/>
+        </p:nvPicPr>
+        <p:blipFill>
+          <a:blip r:embed="rId18">
+            <a:extLst>
+              <a:ext uri="{96DAC541-7B7A-43D3-8B79-37D633B846F1}">
+                <asvg:svgBlip xmlns:asvg="http://schemas.microsoft.com/office/drawing/2016/SVG/main" r:embed="rId19"/>
+              </a:ext>
+            </a:extLst>
+          </a:blip>
+          <a:stretch>
+            <a:fillRect/>
+          </a:stretch>
+        </p:blipFill>
+        <p:spPr>
+          <a:xfrm>
+            <a:off x="11290135" y="3509893"/>
+            <a:ext cx="457200" cy="457200"/>
+          </a:xfrm>
+          <a:prstGeom prst="rect">
+            <a:avLst/>
+          </a:prstGeom>
+        </p:spPr>
+      </p:pic>
+      <p:sp>
+        <p:nvSpPr>
+          <p:cNvPr id="100" name="TextBox 99">
+            <a:extLst>
+              <a:ext uri="{FF2B5EF4-FFF2-40B4-BE49-F238E27FC236}">
+                <a16:creationId xmlns:a16="http://schemas.microsoft.com/office/drawing/2014/main" id="{D11C62A0-80E3-45DE-9B96-21C0D6B89595}"/>
+              </a:ext>
+            </a:extLst>
+          </p:cNvPr>
+          <p:cNvSpPr txBox="1"/>
+          <p:nvPr/>
+        </p:nvSpPr>
+        <p:spPr>
+          <a:xfrm>
+            <a:off x="10793129" y="3973273"/>
+            <a:ext cx="1451213" cy="261610"/>
+          </a:xfrm>
+          <a:prstGeom prst="rect">
+            <a:avLst/>
+          </a:prstGeom>
+          <a:noFill/>
+        </p:spPr>
+        <p:txBody>
+          <a:bodyPr wrap="square" rtlCol="0">
+            <a:spAutoFit/>
+          </a:bodyPr>
+          <a:lstStyle/>
+          <a:p>
+            <a:pPr algn="ctr"/>
+            <a:r>
+              <a:rPr lang="en-US" sz="1100" dirty="0">
+                <a:latin typeface="Arial" panose="020B0604020202020204" pitchFamily="34" charset="0"/>
+                <a:cs typeface="Arial" panose="020B0604020202020204" pitchFamily="34" charset="0"/>
+              </a:rPr>
+              <a:t>Ignition (secondary)</a:t>
+            </a:r>
+          </a:p>
+        </p:txBody>
+      </p:sp>
+      <p:pic>
+        <p:nvPicPr>
+          <p:cNvPr id="42" name="Graphic 60">
+            <a:extLst>
+              <a:ext uri="{FF2B5EF4-FFF2-40B4-BE49-F238E27FC236}">
+                <a16:creationId xmlns:a16="http://schemas.microsoft.com/office/drawing/2014/main" id="{289EDDDB-821A-4C33-81BC-FAC74C8EEB5E}"/>
               </a:ext>
             </a:extLst>
           </p:cNvPr>
@@ -7498,9 +7684,17 @@
           <p:nvPr/>
         </p:nvPicPr>
         <p:blipFill>
-          <a:blip r:embed="rId16">
-            <a:alphaModFix amt="50000"/>
-            <a:extLst>
+          <a:blip r:embed="rId20">
+            <a:extLst>
+              <a:ext uri="{BEBA8EAE-BF5A-486C-A8C5-ECC9F3942E4B}">
+                <a14:imgProps xmlns:a14="http://schemas.microsoft.com/office/drawing/2010/main">
+                  <a14:imgLayer r:embed="rId21">
+                    <a14:imgEffect>
+                      <a14:artisticBlur/>
+                    </a14:imgEffect>
+                  </a14:imgLayer>
+                </a14:imgProps>
+              </a:ext>
               <a:ext uri="{28A0092B-C50C-407E-A947-70E740481C1C}">
                 <a14:useLocalDpi xmlns:a14="http://schemas.microsoft.com/office/drawing/2010/main" val="0"/>
               </a:ext>
@@ -7513,7 +7707,7 @@
         </p:blipFill>
         <p:spPr bwMode="auto">
           <a:xfrm>
-            <a:off x="10725302" y="2626068"/>
+            <a:off x="7589520" y="2624328"/>
             <a:ext cx="457200" cy="457200"/>
           </a:xfrm>
           <a:prstGeom prst="rect">
@@ -7546,196 +7740,10 @@
       </p:pic>
       <p:pic>
         <p:nvPicPr>
-          <p:cNvPr id="96" name="Graphic 95">
+          <p:cNvPr id="43" name="Graphic 60">
             <a:extLst>
               <a:ext uri="{FF2B5EF4-FFF2-40B4-BE49-F238E27FC236}">
-                <a16:creationId xmlns:a16="http://schemas.microsoft.com/office/drawing/2014/main" id="{05BEC7FA-85AB-4B62-A8C8-793BCCFBC367}"/>
-              </a:ext>
-            </a:extLst>
-          </p:cNvPr>
-          <p:cNvPicPr>
-            <a:picLocks noChangeAspect="1"/>
-          </p:cNvPicPr>
-          <p:nvPr/>
-        </p:nvPicPr>
-        <p:blipFill>
-          <a:blip r:embed="rId17">
-            <a:extLst>
-              <a:ext uri="{96DAC541-7B7A-43D3-8B79-37D633B846F1}">
-                <asvg:svgBlip xmlns:asvg="http://schemas.microsoft.com/office/drawing/2016/SVG/main" r:embed="rId18"/>
-              </a:ext>
-            </a:extLst>
-          </a:blip>
-          <a:stretch>
-            <a:fillRect/>
-          </a:stretch>
-        </p:blipFill>
-        <p:spPr>
-          <a:xfrm>
-            <a:off x="9261385" y="2525662"/>
-            <a:ext cx="330200" cy="330200"/>
-          </a:xfrm>
-          <a:prstGeom prst="rect">
-            <a:avLst/>
-          </a:prstGeom>
-        </p:spPr>
-      </p:pic>
-      <p:pic>
-        <p:nvPicPr>
-          <p:cNvPr id="97" name="Graphic 96">
-            <a:extLst>
-              <a:ext uri="{FF2B5EF4-FFF2-40B4-BE49-F238E27FC236}">
-                <a16:creationId xmlns:a16="http://schemas.microsoft.com/office/drawing/2014/main" id="{A87BFE51-1EA6-4570-81C3-20628DBE749F}"/>
-              </a:ext>
-            </a:extLst>
-          </p:cNvPr>
-          <p:cNvPicPr>
-            <a:picLocks noChangeAspect="1"/>
-          </p:cNvPicPr>
-          <p:nvPr/>
-        </p:nvPicPr>
-        <p:blipFill>
-          <a:blip r:embed="rId19">
-            <a:extLst>
-              <a:ext uri="{96DAC541-7B7A-43D3-8B79-37D633B846F1}">
-                <asvg:svgBlip xmlns:asvg="http://schemas.microsoft.com/office/drawing/2016/SVG/main" r:embed="rId20"/>
-              </a:ext>
-            </a:extLst>
-          </a:blip>
-          <a:stretch>
-            <a:fillRect/>
-          </a:stretch>
-        </p:blipFill>
-        <p:spPr>
-          <a:xfrm>
-            <a:off x="7072472" y="3509893"/>
-            <a:ext cx="457200" cy="457200"/>
-          </a:xfrm>
-          <a:prstGeom prst="rect">
-            <a:avLst/>
-          </a:prstGeom>
-        </p:spPr>
-      </p:pic>
-      <p:sp>
-        <p:nvSpPr>
-          <p:cNvPr id="98" name="TextBox 97">
-            <a:extLst>
-              <a:ext uri="{FF2B5EF4-FFF2-40B4-BE49-F238E27FC236}">
-                <a16:creationId xmlns:a16="http://schemas.microsoft.com/office/drawing/2014/main" id="{2B774141-3304-4EF1-877E-9760009B4190}"/>
-              </a:ext>
-            </a:extLst>
-          </p:cNvPr>
-          <p:cNvSpPr txBox="1"/>
-          <p:nvPr/>
-        </p:nvSpPr>
-        <p:spPr>
-          <a:xfrm>
-            <a:off x="6684453" y="3941852"/>
-            <a:ext cx="1233238" cy="261610"/>
-          </a:xfrm>
-          <a:prstGeom prst="rect">
-            <a:avLst/>
-          </a:prstGeom>
-          <a:noFill/>
-        </p:spPr>
-        <p:txBody>
-          <a:bodyPr wrap="square" rtlCol="0">
-            <a:spAutoFit/>
-          </a:bodyPr>
-          <a:lstStyle/>
-          <a:p>
-            <a:pPr algn="ctr"/>
-            <a:r>
-              <a:rPr lang="en-US" sz="1100" dirty="0">
-                <a:latin typeface="Arial" panose="020B0604020202020204" pitchFamily="34" charset="0"/>
-                <a:cs typeface="Arial" panose="020B0604020202020204" pitchFamily="34" charset="0"/>
-              </a:rPr>
-              <a:t>Ignition (primary)</a:t>
-            </a:r>
-          </a:p>
-        </p:txBody>
-      </p:sp>
-      <p:pic>
-        <p:nvPicPr>
-          <p:cNvPr id="99" name="Graphic 98">
-            <a:extLst>
-              <a:ext uri="{FF2B5EF4-FFF2-40B4-BE49-F238E27FC236}">
-                <a16:creationId xmlns:a16="http://schemas.microsoft.com/office/drawing/2014/main" id="{C3625EC4-0DF0-4D2E-BF9E-E8A11359F645}"/>
-              </a:ext>
-            </a:extLst>
-          </p:cNvPr>
-          <p:cNvPicPr>
-            <a:picLocks noChangeAspect="1"/>
-          </p:cNvPicPr>
-          <p:nvPr/>
-        </p:nvPicPr>
-        <p:blipFill>
-          <a:blip r:embed="rId19">
-            <a:extLst>
-              <a:ext uri="{96DAC541-7B7A-43D3-8B79-37D633B846F1}">
-                <asvg:svgBlip xmlns:asvg="http://schemas.microsoft.com/office/drawing/2016/SVG/main" r:embed="rId20"/>
-              </a:ext>
-            </a:extLst>
-          </a:blip>
-          <a:stretch>
-            <a:fillRect/>
-          </a:stretch>
-        </p:blipFill>
-        <p:spPr>
-          <a:xfrm>
-            <a:off x="11290135" y="3509893"/>
-            <a:ext cx="457200" cy="457200"/>
-          </a:xfrm>
-          <a:prstGeom prst="rect">
-            <a:avLst/>
-          </a:prstGeom>
-        </p:spPr>
-      </p:pic>
-      <p:sp>
-        <p:nvSpPr>
-          <p:cNvPr id="100" name="TextBox 99">
-            <a:extLst>
-              <a:ext uri="{FF2B5EF4-FFF2-40B4-BE49-F238E27FC236}">
-                <a16:creationId xmlns:a16="http://schemas.microsoft.com/office/drawing/2014/main" id="{D11C62A0-80E3-45DE-9B96-21C0D6B89595}"/>
-              </a:ext>
-            </a:extLst>
-          </p:cNvPr>
-          <p:cNvSpPr txBox="1"/>
-          <p:nvPr/>
-        </p:nvSpPr>
-        <p:spPr>
-          <a:xfrm>
-            <a:off x="10793129" y="3973273"/>
-            <a:ext cx="1451213" cy="261610"/>
-          </a:xfrm>
-          <a:prstGeom prst="rect">
-            <a:avLst/>
-          </a:prstGeom>
-          <a:noFill/>
-        </p:spPr>
-        <p:txBody>
-          <a:bodyPr wrap="square" rtlCol="0">
-            <a:spAutoFit/>
-          </a:bodyPr>
-          <a:lstStyle/>
-          <a:p>
-            <a:pPr algn="ctr"/>
-            <a:r>
-              <a:rPr lang="en-US" sz="1100" dirty="0">
-                <a:latin typeface="Arial" panose="020B0604020202020204" pitchFamily="34" charset="0"/>
-                <a:cs typeface="Arial" panose="020B0604020202020204" pitchFamily="34" charset="0"/>
-              </a:rPr>
-              <a:t>Ignition (secondary)</a:t>
-            </a:r>
-          </a:p>
-        </p:txBody>
-      </p:sp>
-      <p:pic>
-        <p:nvPicPr>
-          <p:cNvPr id="101" name="Graphic 60">
-            <a:extLst>
-              <a:ext uri="{FF2B5EF4-FFF2-40B4-BE49-F238E27FC236}">
-                <a16:creationId xmlns:a16="http://schemas.microsoft.com/office/drawing/2014/main" id="{66ADE8D0-C71A-4C0A-AC2A-93685FF13775}"/>
+                <a16:creationId xmlns:a16="http://schemas.microsoft.com/office/drawing/2014/main" id="{BB820C92-7090-49B7-A1A3-1E7AF7F40F5C}"/>
               </a:ext>
             </a:extLst>
           </p:cNvPr>
@@ -7745,9 +7753,17 @@
           <p:nvPr/>
         </p:nvPicPr>
         <p:blipFill>
-          <a:blip r:embed="rId16">
-            <a:alphaModFix amt="50000"/>
-            <a:extLst>
+          <a:blip r:embed="rId20">
+            <a:extLst>
+              <a:ext uri="{BEBA8EAE-BF5A-486C-A8C5-ECC9F3942E4B}">
+                <a14:imgProps xmlns:a14="http://schemas.microsoft.com/office/drawing/2010/main">
+                  <a14:imgLayer r:embed="rId21">
+                    <a14:imgEffect>
+                      <a14:artisticBlur/>
+                    </a14:imgEffect>
+                  </a14:imgLayer>
+                </a14:imgProps>
+              </a:ext>
               <a:ext uri="{28A0092B-C50C-407E-A947-70E740481C1C}">
                 <a14:useLocalDpi xmlns:a14="http://schemas.microsoft.com/office/drawing/2010/main" val="0"/>
               </a:ext>
@@ -7760,7 +7776,7 @@
         </p:blipFill>
         <p:spPr bwMode="auto">
           <a:xfrm>
-            <a:off x="7589520" y="2624328"/>
+            <a:off x="10725912" y="2624328"/>
             <a:ext cx="457200" cy="457200"/>
           </a:xfrm>
           <a:prstGeom prst="rect">

</xml_diff>